<commit_message>
Update hierarchy of files
according to use cases
</commit_message>
<xml_diff>
--- a/Meetings/MIGAN_Meeting minutes.pptx
+++ b/Meetings/MIGAN_Meeting minutes.pptx
@@ -5,10 +5,10 @@
     <p:sldMasterId id="2147483660" r:id="rId1"/>
   </p:sldMasterIdLst>
   <p:notesMasterIdLst>
-    <p:notesMasterId r:id="rId12"/>
+    <p:notesMasterId r:id="rId14"/>
   </p:notesMasterIdLst>
   <p:handoutMasterIdLst>
-    <p:handoutMasterId r:id="rId13"/>
+    <p:handoutMasterId r:id="rId15"/>
   </p:handoutMasterIdLst>
   <p:sldIdLst>
     <p:sldId id="1246" r:id="rId2"/>
@@ -21,6 +21,8 @@
     <p:sldId id="1270" r:id="rId9"/>
     <p:sldId id="1271" r:id="rId10"/>
     <p:sldId id="1272" r:id="rId11"/>
+    <p:sldId id="1273" r:id="rId12"/>
+    <p:sldId id="1274" r:id="rId13"/>
   </p:sldIdLst>
   <p:sldSz cx="12192000" cy="6858000"/>
   <p:notesSz cx="6805613" cy="9944100"/>
@@ -310,7 +312,7 @@
               <a:pPr>
                 <a:defRPr/>
               </a:pPr>
-              <a:t>2021/5/26</a:t>
+              <a:t>2021/6/16</a:t>
             </a:fld>
             <a:endParaRPr lang="en-US" altLang="zh-TW"/>
           </a:p>
@@ -535,7 +537,7 @@
               <a:pPr>
                 <a:defRPr/>
               </a:pPr>
-              <a:t>5/26/2021</a:t>
+              <a:t>6/16/2021</a:t>
             </a:fld>
             <a:endParaRPr lang="en-US" altLang="zh-CN"/>
           </a:p>
@@ -1329,17 +1331,17 @@
           </a:ln>
           <a:extLst>
             <a:ext uri="{FAA26D3D-D897-4be2-8F04-BA451C77F1D7}">
-              <ma14:placeholderFlag xmlns="" xmlns:ma14="http://schemas.microsoft.com/office/mac/drawingml/2011/main" val="1"/>
+              <ma14:placeholderFlag xmlns:ma14="http://schemas.microsoft.com/office/mac/drawingml/2011/main" xmlns="" val="1"/>
             </a:ext>
             <a:ext uri="{909E8E84-426E-40dd-AFC4-6F175D3DCCD1}">
-              <a14:hiddenFill xmlns="" xmlns:a14="http://schemas.microsoft.com/office/drawing/2010/main">
+              <a14:hiddenFill xmlns:a14="http://schemas.microsoft.com/office/drawing/2010/main" xmlns="">
                 <a:solidFill>
                   <a:srgbClr val="FFFFFF"/>
                 </a:solidFill>
               </a14:hiddenFill>
             </a:ext>
             <a:ext uri="{91240B29-F687-4f45-9708-019B960494DF}">
-              <a14:hiddenLine xmlns="" xmlns:a14="http://schemas.microsoft.com/office/drawing/2010/main" w="9525">
+              <a14:hiddenLine xmlns:a14="http://schemas.microsoft.com/office/drawing/2010/main" xmlns="" w="9525">
                 <a:solidFill>
                   <a:srgbClr val="000000"/>
                 </a:solidFill>
@@ -1390,17 +1392,17 @@
           </a:ln>
           <a:extLst>
             <a:ext uri="{FAA26D3D-D897-4be2-8F04-BA451C77F1D7}">
-              <ma14:placeholderFlag xmlns="" xmlns:ma14="http://schemas.microsoft.com/office/mac/drawingml/2011/main" val="1"/>
+              <ma14:placeholderFlag xmlns:ma14="http://schemas.microsoft.com/office/mac/drawingml/2011/main" xmlns="" val="1"/>
             </a:ext>
             <a:ext uri="{909E8E84-426E-40dd-AFC4-6F175D3DCCD1}">
-              <a14:hiddenFill xmlns="" xmlns:a14="http://schemas.microsoft.com/office/drawing/2010/main">
+              <a14:hiddenFill xmlns:a14="http://schemas.microsoft.com/office/drawing/2010/main" xmlns="">
                 <a:solidFill>
                   <a:srgbClr val="FFFFFF"/>
                 </a:solidFill>
               </a14:hiddenFill>
             </a:ext>
             <a:ext uri="{91240B29-F687-4f45-9708-019B960494DF}">
-              <a14:hiddenLine xmlns="" xmlns:a14="http://schemas.microsoft.com/office/drawing/2010/main" w="9525">
+              <a14:hiddenLine xmlns:a14="http://schemas.microsoft.com/office/drawing/2010/main" xmlns="" w="9525">
                 <a:solidFill>
                   <a:srgbClr val="000000"/>
                 </a:solidFill>
@@ -2898,6 +2900,400 @@
     <p:extLst>
       <p:ext uri="{BB962C8B-B14F-4D97-AF65-F5344CB8AC3E}">
         <p14:creationId xmlns:p14="http://schemas.microsoft.com/office/powerpoint/2010/main" val="524741195"/>
+      </p:ext>
+    </p:extLst>
+  </p:cSld>
+  <p:clrMapOvr>
+    <a:masterClrMapping/>
+  </p:clrMapOvr>
+  <mc:AlternateContent xmlns:mc="http://schemas.openxmlformats.org/markup-compatibility/2006" xmlns:p14="http://schemas.microsoft.com/office/powerpoint/2010/main">
+    <mc:Choice Requires="p14">
+      <p:transition spd="slow" p14:dur="1200">
+        <p14:prism/>
+      </p:transition>
+    </mc:Choice>
+    <mc:Fallback xmlns="">
+      <p:transition spd="slow">
+        <p:fade/>
+      </p:transition>
+    </mc:Fallback>
+  </mc:AlternateContent>
+</p:sld>
+</file>
+
+<file path=ppt/slides/slide11.xml><?xml version="1.0" encoding="utf-8"?>
+<p:sld xmlns:a="http://schemas.openxmlformats.org/drawingml/2006/main" xmlns:r="http://schemas.openxmlformats.org/officeDocument/2006/relationships" xmlns:p="http://schemas.openxmlformats.org/presentationml/2006/main">
+  <p:cSld>
+    <p:spTree>
+      <p:nvGrpSpPr>
+        <p:cNvPr id="1" name=""/>
+        <p:cNvGrpSpPr/>
+        <p:nvPr/>
+      </p:nvGrpSpPr>
+      <p:grpSpPr>
+        <a:xfrm>
+          <a:off x="0" y="0"/>
+          <a:ext cx="0" cy="0"/>
+          <a:chOff x="0" y="0"/>
+          <a:chExt cx="0" cy="0"/>
+        </a:xfrm>
+      </p:grpSpPr>
+      <p:pic>
+        <p:nvPicPr>
+          <p:cNvPr id="6" name="图片 5" descr="图示&#10;&#10;描述已自动生成">
+            <a:extLst>
+              <a:ext uri="{FF2B5EF4-FFF2-40B4-BE49-F238E27FC236}">
+                <a16:creationId xmlns:a16="http://schemas.microsoft.com/office/drawing/2014/main" id="{4A042BF0-DCA7-4AB8-8E50-0F0A626ACFD8}"/>
+              </a:ext>
+            </a:extLst>
+          </p:cNvPr>
+          <p:cNvPicPr>
+            <a:picLocks noChangeAspect="1"/>
+          </p:cNvPicPr>
+          <p:nvPr/>
+        </p:nvPicPr>
+        <p:blipFill>
+          <a:blip r:embed="rId2" cstate="email">
+            <a:extLst>
+              <a:ext uri="{28A0092B-C50C-407E-A947-70E740481C1C}">
+                <a14:useLocalDpi xmlns:a14="http://schemas.microsoft.com/office/drawing/2010/main" val="0"/>
+              </a:ext>
+            </a:extLst>
+          </a:blip>
+          <a:stretch>
+            <a:fillRect/>
+          </a:stretch>
+        </p:blipFill>
+        <p:spPr>
+          <a:xfrm rot="16200000">
+            <a:off x="5651703" y="-406422"/>
+            <a:ext cx="5514348" cy="7362058"/>
+          </a:xfrm>
+          <a:prstGeom prst="rect">
+            <a:avLst/>
+          </a:prstGeom>
+        </p:spPr>
+      </p:pic>
+      <p:sp>
+        <p:nvSpPr>
+          <p:cNvPr id="9" name="文本框 8">
+            <a:extLst>
+              <a:ext uri="{FF2B5EF4-FFF2-40B4-BE49-F238E27FC236}">
+                <a16:creationId xmlns:a16="http://schemas.microsoft.com/office/drawing/2014/main" id="{262E268C-12B5-4F14-92CA-C86CE6E74E9A}"/>
+              </a:ext>
+            </a:extLst>
+          </p:cNvPr>
+          <p:cNvSpPr txBox="1"/>
+          <p:nvPr/>
+        </p:nvSpPr>
+        <p:spPr>
+          <a:xfrm>
+            <a:off x="975" y="1203768"/>
+            <a:ext cx="6094520" cy="1753750"/>
+          </a:xfrm>
+          <a:prstGeom prst="rect">
+            <a:avLst/>
+          </a:prstGeom>
+          <a:noFill/>
+        </p:spPr>
+        <p:txBody>
+          <a:bodyPr wrap="square">
+            <a:spAutoFit/>
+          </a:bodyPr>
+          <a:lstStyle/>
+          <a:p>
+            <a:pPr marL="800100" lvl="1" indent="-342900" algn="l" fontAlgn="auto">
+              <a:lnSpc>
+                <a:spcPct val="120000"/>
+              </a:lnSpc>
+              <a:spcBef>
+                <a:spcPts val="1200"/>
+              </a:spcBef>
+              <a:spcAft>
+                <a:spcPts val="500"/>
+              </a:spcAft>
+              <a:buSzPct val="100000"/>
+              <a:buFont typeface="Arial" panose="020B0604020202020204" pitchFamily="34" charset="0"/>
+              <a:buChar char="•"/>
+              <a:defRPr/>
+            </a:pPr>
+            <a:r>
+              <a:rPr lang="en-US" altLang="zh-CN" sz="2000" dirty="0">
+                <a:latin typeface="Arial" panose="020B0604020202020204" pitchFamily="34" charset="0"/>
+                <a:ea typeface="+mn-ea"/>
+                <a:cs typeface="Arial" panose="020B0604020202020204" pitchFamily="34" charset="0"/>
+              </a:rPr>
+              <a:t>6.15</a:t>
+            </a:r>
+          </a:p>
+          <a:p>
+            <a:pPr marL="800100" lvl="1" indent="-342900" algn="l" fontAlgn="auto">
+              <a:lnSpc>
+                <a:spcPct val="120000"/>
+              </a:lnSpc>
+              <a:spcBef>
+                <a:spcPts val="1200"/>
+              </a:spcBef>
+              <a:spcAft>
+                <a:spcPts val="500"/>
+              </a:spcAft>
+              <a:buSzPct val="100000"/>
+              <a:buFont typeface="Arial" panose="020B0604020202020204" pitchFamily="34" charset="0"/>
+              <a:buChar char="•"/>
+              <a:defRPr/>
+            </a:pPr>
+            <a:r>
+              <a:rPr lang="en-US" altLang="zh-CN" sz="2000" dirty="0">
+                <a:latin typeface="Arial" panose="020B0604020202020204" pitchFamily="34" charset="0"/>
+                <a:ea typeface="+mn-ea"/>
+                <a:cs typeface="Arial" panose="020B0604020202020204" pitchFamily="34" charset="0"/>
+              </a:rPr>
+              <a:t>Discuss the structure of foreground and background module for text-to-image generation</a:t>
+            </a:r>
+            <a:endParaRPr lang="en-US" altLang="zh-CN" sz="1600" dirty="0">
+              <a:latin typeface="Arial" panose="020B0604020202020204" pitchFamily="34" charset="0"/>
+              <a:ea typeface="+mn-ea"/>
+              <a:cs typeface="Arial" panose="020B0604020202020204" pitchFamily="34" charset="0"/>
+            </a:endParaRPr>
+          </a:p>
+        </p:txBody>
+      </p:sp>
+    </p:spTree>
+    <p:extLst>
+      <p:ext uri="{BB962C8B-B14F-4D97-AF65-F5344CB8AC3E}">
+        <p14:creationId xmlns:p14="http://schemas.microsoft.com/office/powerpoint/2010/main" val="793026537"/>
+      </p:ext>
+    </p:extLst>
+  </p:cSld>
+  <p:clrMapOvr>
+    <a:masterClrMapping/>
+  </p:clrMapOvr>
+  <mc:AlternateContent xmlns:mc="http://schemas.openxmlformats.org/markup-compatibility/2006" xmlns:p14="http://schemas.microsoft.com/office/powerpoint/2010/main">
+    <mc:Choice Requires="p14">
+      <p:transition spd="slow" p14:dur="1200">
+        <p14:prism/>
+      </p:transition>
+    </mc:Choice>
+    <mc:Fallback xmlns="">
+      <p:transition spd="slow">
+        <p:fade/>
+      </p:transition>
+    </mc:Fallback>
+  </mc:AlternateContent>
+</p:sld>
+</file>
+
+<file path=ppt/slides/slide12.xml><?xml version="1.0" encoding="utf-8"?>
+<p:sld xmlns:a="http://schemas.openxmlformats.org/drawingml/2006/main" xmlns:r="http://schemas.openxmlformats.org/officeDocument/2006/relationships" xmlns:p="http://schemas.openxmlformats.org/presentationml/2006/main">
+  <p:cSld>
+    <p:spTree>
+      <p:nvGrpSpPr>
+        <p:cNvPr id="1" name=""/>
+        <p:cNvGrpSpPr/>
+        <p:nvPr/>
+      </p:nvGrpSpPr>
+      <p:grpSpPr>
+        <a:xfrm>
+          <a:off x="0" y="0"/>
+          <a:ext cx="0" cy="0"/>
+          <a:chOff x="0" y="0"/>
+          <a:chExt cx="0" cy="0"/>
+        </a:xfrm>
+      </p:grpSpPr>
+      <p:pic>
+        <p:nvPicPr>
+          <p:cNvPr id="4" name="图片 3" descr="图示&#10;&#10;描述已自动生成">
+            <a:extLst>
+              <a:ext uri="{FF2B5EF4-FFF2-40B4-BE49-F238E27FC236}">
+                <a16:creationId xmlns:a16="http://schemas.microsoft.com/office/drawing/2014/main" id="{0D515298-7E27-44F2-BB30-63DB74388304}"/>
+              </a:ext>
+            </a:extLst>
+          </p:cNvPr>
+          <p:cNvPicPr>
+            <a:picLocks noChangeAspect="1"/>
+          </p:cNvPicPr>
+          <p:nvPr/>
+        </p:nvPicPr>
+        <p:blipFill>
+          <a:blip r:embed="rId2" cstate="email">
+            <a:extLst>
+              <a:ext uri="{28A0092B-C50C-407E-A947-70E740481C1C}">
+                <a14:useLocalDpi xmlns:a14="http://schemas.microsoft.com/office/drawing/2010/main" val="0"/>
+              </a:ext>
+            </a:extLst>
+          </a:blip>
+          <a:stretch>
+            <a:fillRect/>
+          </a:stretch>
+        </p:blipFill>
+        <p:spPr>
+          <a:xfrm>
+            <a:off x="4799856" y="188640"/>
+            <a:ext cx="7142678" cy="5758901"/>
+          </a:xfrm>
+          <a:prstGeom prst="rect">
+            <a:avLst/>
+          </a:prstGeom>
+        </p:spPr>
+      </p:pic>
+      <p:sp>
+        <p:nvSpPr>
+          <p:cNvPr id="9" name="文本框 8">
+            <a:extLst>
+              <a:ext uri="{FF2B5EF4-FFF2-40B4-BE49-F238E27FC236}">
+                <a16:creationId xmlns:a16="http://schemas.microsoft.com/office/drawing/2014/main" id="{262E268C-12B5-4F14-92CA-C86CE6E74E9A}"/>
+              </a:ext>
+            </a:extLst>
+          </p:cNvPr>
+          <p:cNvSpPr txBox="1"/>
+          <p:nvPr/>
+        </p:nvSpPr>
+        <p:spPr>
+          <a:xfrm>
+            <a:off x="975" y="1203768"/>
+            <a:ext cx="4798881" cy="4993098"/>
+          </a:xfrm>
+          <a:prstGeom prst="rect">
+            <a:avLst/>
+          </a:prstGeom>
+          <a:noFill/>
+        </p:spPr>
+        <p:txBody>
+          <a:bodyPr wrap="square">
+            <a:spAutoFit/>
+          </a:bodyPr>
+          <a:lstStyle/>
+          <a:p>
+            <a:pPr marL="800100" lvl="1" indent="-342900" algn="l" fontAlgn="auto">
+              <a:lnSpc>
+                <a:spcPct val="120000"/>
+              </a:lnSpc>
+              <a:spcBef>
+                <a:spcPts val="1200"/>
+              </a:spcBef>
+              <a:spcAft>
+                <a:spcPts val="500"/>
+              </a:spcAft>
+              <a:buSzPct val="100000"/>
+              <a:buFont typeface="Arial" panose="020B0604020202020204" pitchFamily="34" charset="0"/>
+              <a:buChar char="•"/>
+              <a:defRPr/>
+            </a:pPr>
+            <a:r>
+              <a:rPr lang="en-US" altLang="zh-CN" sz="2000" dirty="0">
+                <a:latin typeface="Arial" panose="020B0604020202020204" pitchFamily="34" charset="0"/>
+                <a:ea typeface="+mn-ea"/>
+                <a:cs typeface="Arial" panose="020B0604020202020204" pitchFamily="34" charset="0"/>
+              </a:rPr>
+              <a:t>6.16</a:t>
+            </a:r>
+          </a:p>
+          <a:p>
+            <a:pPr marL="800100" lvl="1" indent="-342900" algn="l" fontAlgn="auto">
+              <a:lnSpc>
+                <a:spcPct val="120000"/>
+              </a:lnSpc>
+              <a:spcBef>
+                <a:spcPts val="1200"/>
+              </a:spcBef>
+              <a:spcAft>
+                <a:spcPts val="500"/>
+              </a:spcAft>
+              <a:buSzPct val="100000"/>
+              <a:buFont typeface="Arial" panose="020B0604020202020204" pitchFamily="34" charset="0"/>
+              <a:buChar char="•"/>
+              <a:defRPr/>
+            </a:pPr>
+            <a:r>
+              <a:rPr lang="en-US" altLang="zh-CN" sz="2000" dirty="0">
+                <a:latin typeface="Arial" panose="020B0604020202020204" pitchFamily="34" charset="0"/>
+                <a:ea typeface="+mn-ea"/>
+                <a:cs typeface="Arial" panose="020B0604020202020204" pitchFamily="34" charset="0"/>
+              </a:rPr>
+              <a:t>Discussed compose module (future work)</a:t>
+            </a:r>
+          </a:p>
+          <a:p>
+            <a:pPr marL="800100" lvl="1" indent="-342900" algn="l" fontAlgn="auto">
+              <a:lnSpc>
+                <a:spcPct val="120000"/>
+              </a:lnSpc>
+              <a:spcBef>
+                <a:spcPts val="1200"/>
+              </a:spcBef>
+              <a:spcAft>
+                <a:spcPts val="500"/>
+              </a:spcAft>
+              <a:buSzPct val="100000"/>
+              <a:buFont typeface="Arial" panose="020B0604020202020204" pitchFamily="34" charset="0"/>
+              <a:buChar char="•"/>
+              <a:defRPr/>
+            </a:pPr>
+            <a:r>
+              <a:rPr lang="en-US" altLang="zh-CN" sz="2000" dirty="0">
+                <a:latin typeface="Arial" panose="020B0604020202020204" pitchFamily="34" charset="0"/>
+                <a:ea typeface="+mn-ea"/>
+                <a:cs typeface="Arial" panose="020B0604020202020204" pitchFamily="34" charset="0"/>
+              </a:rPr>
+              <a:t>Background done. Difference between sequential layered paper.</a:t>
+            </a:r>
+          </a:p>
+          <a:p>
+            <a:pPr marL="800100" lvl="1" indent="-342900" algn="l" fontAlgn="auto">
+              <a:lnSpc>
+                <a:spcPct val="120000"/>
+              </a:lnSpc>
+              <a:spcBef>
+                <a:spcPts val="1200"/>
+              </a:spcBef>
+              <a:spcAft>
+                <a:spcPts val="500"/>
+              </a:spcAft>
+              <a:buSzPct val="100000"/>
+              <a:buFont typeface="Arial" panose="020B0604020202020204" pitchFamily="34" charset="0"/>
+              <a:buChar char="•"/>
+              <a:defRPr/>
+            </a:pPr>
+            <a:r>
+              <a:rPr lang="en-US" altLang="zh-CN" sz="2000" dirty="0">
+                <a:latin typeface="Arial" panose="020B0604020202020204" pitchFamily="34" charset="0"/>
+                <a:ea typeface="+mn-ea"/>
+                <a:cs typeface="Arial" panose="020B0604020202020204" pitchFamily="34" charset="0"/>
+              </a:rPr>
+              <a:t>1.Search text 2 image papers</a:t>
+            </a:r>
+          </a:p>
+          <a:p>
+            <a:pPr marL="800100" lvl="1" indent="-342900" algn="l" fontAlgn="auto">
+              <a:lnSpc>
+                <a:spcPct val="120000"/>
+              </a:lnSpc>
+              <a:spcBef>
+                <a:spcPts val="1200"/>
+              </a:spcBef>
+              <a:spcAft>
+                <a:spcPts val="500"/>
+              </a:spcAft>
+              <a:buSzPct val="100000"/>
+              <a:buFont typeface="Arial" panose="020B0604020202020204" pitchFamily="34" charset="0"/>
+              <a:buChar char="•"/>
+              <a:defRPr/>
+            </a:pPr>
+            <a:r>
+              <a:rPr lang="en-US" altLang="zh-CN" sz="2000" dirty="0">
+                <a:latin typeface="Arial" panose="020B0604020202020204" pitchFamily="34" charset="0"/>
+                <a:ea typeface="+mn-ea"/>
+                <a:cs typeface="Arial" panose="020B0604020202020204" pitchFamily="34" charset="0"/>
+              </a:rPr>
+              <a:t>2.Think and discuss all possible designs (input, output, dataset) of foreground module with different model structure (sequential / parallel) for training and inference.</a:t>
+            </a:r>
+          </a:p>
+        </p:txBody>
+      </p:sp>
+    </p:spTree>
+    <p:extLst>
+      <p:ext uri="{BB962C8B-B14F-4D97-AF65-F5344CB8AC3E}">
+        <p14:creationId xmlns:p14="http://schemas.microsoft.com/office/powerpoint/2010/main" val="2092724826"/>
       </p:ext>
     </p:extLst>
   </p:cSld>

</xml_diff>